<commit_message>
updated slides with a SetStrategy method
</commit_message>
<xml_diff>
--- a/02 Strategy/Patterns - Strategy.pptx
+++ b/02 Strategy/Patterns - Strategy.pptx
@@ -141,6 +141,129 @@
 </p:presentation>
 </file>
 
+<file path=ppt/revisionInfo.xml><?xml version="1.0" encoding="utf-8"?>
+<p1510:revInfo xmlns:a="http://schemas.openxmlformats.org/drawingml/2006/main" xmlns:r="http://schemas.openxmlformats.org/officeDocument/2006/relationships" xmlns:p1510="http://schemas.microsoft.com/office/powerpoint/2015/10/main">
+  <p1510:revLst>
+    <p1510:client id="{4F27C1B4-0D77-4F3F-ADC0-57B508901BC1}" v="20" dt="2024-09-04T18:37:50.444"/>
+  </p1510:revLst>
+</p1510:revInfo>
+</file>
+
+<file path=ppt/changesInfos/changesInfo1.xml><?xml version="1.0" encoding="utf-8"?>
+<pc:chgInfo xmlns:a="http://schemas.openxmlformats.org/drawingml/2006/main" xmlns:r="http://schemas.openxmlformats.org/officeDocument/2006/relationships" xmlns:ac="http://schemas.microsoft.com/office/drawing/2013/main/command" xmlns:pc="http://schemas.microsoft.com/office/powerpoint/2013/main/command">
+  <pc:docChgLst>
+    <pc:chgData name="Michael Sørensen Loft" userId="42949a3e-5aba-4e5d-931a-6d7b2cf6ec97" providerId="ADAL" clId="{4F27C1B4-0D77-4F3F-ADC0-57B508901BC1}"/>
+    <pc:docChg chg="custSel modSld">
+      <pc:chgData name="Michael Sørensen Loft" userId="42949a3e-5aba-4e5d-931a-6d7b2cf6ec97" providerId="ADAL" clId="{4F27C1B4-0D77-4F3F-ADC0-57B508901BC1}" dt="2024-09-04T18:37:50.443" v="29" actId="1076"/>
+      <pc:docMkLst>
+        <pc:docMk/>
+      </pc:docMkLst>
+      <pc:sldChg chg="addSp delSp modSp mod">
+        <pc:chgData name="Michael Sørensen Loft" userId="42949a3e-5aba-4e5d-931a-6d7b2cf6ec97" providerId="ADAL" clId="{4F27C1B4-0D77-4F3F-ADC0-57B508901BC1}" dt="2024-09-04T18:37:50.443" v="29" actId="1076"/>
+        <pc:sldMkLst>
+          <pc:docMk/>
+          <pc:sldMk cId="2237530723" sldId="282"/>
+        </pc:sldMkLst>
+        <pc:spChg chg="mod">
+          <ac:chgData name="Michael Sørensen Loft" userId="42949a3e-5aba-4e5d-931a-6d7b2cf6ec97" providerId="ADAL" clId="{4F27C1B4-0D77-4F3F-ADC0-57B508901BC1}" dt="2024-09-04T18:37:25.792" v="24" actId="5793"/>
+          <ac:spMkLst>
+            <pc:docMk/>
+            <pc:sldMk cId="2237530723" sldId="282"/>
+            <ac:spMk id="9" creationId="{00000000-0000-0000-0000-000000000000}"/>
+          </ac:spMkLst>
+        </pc:spChg>
+        <pc:picChg chg="del">
+          <ac:chgData name="Michael Sørensen Loft" userId="42949a3e-5aba-4e5d-931a-6d7b2cf6ec97" providerId="ADAL" clId="{4F27C1B4-0D77-4F3F-ADC0-57B508901BC1}" dt="2024-09-04T18:35:35.438" v="0" actId="478"/>
+          <ac:picMkLst>
+            <pc:docMk/>
+            <pc:sldMk cId="2237530723" sldId="282"/>
+            <ac:picMk id="8" creationId="{00000000-0000-0000-0000-000000000000}"/>
+          </ac:picMkLst>
+        </pc:picChg>
+        <pc:picChg chg="add mod">
+          <ac:chgData name="Michael Sørensen Loft" userId="42949a3e-5aba-4e5d-931a-6d7b2cf6ec97" providerId="ADAL" clId="{4F27C1B4-0D77-4F3F-ADC0-57B508901BC1}" dt="2024-09-04T18:37:50.443" v="29" actId="1076"/>
+          <ac:picMkLst>
+            <pc:docMk/>
+            <pc:sldMk cId="2237530723" sldId="282"/>
+            <ac:picMk id="1026" creationId="{D700E3D3-E45E-AE80-AFE9-0873F54BB7F0}"/>
+          </ac:picMkLst>
+        </pc:picChg>
+      </pc:sldChg>
+      <pc:sldChg chg="addSp delSp modSp">
+        <pc:chgData name="Michael Sørensen Loft" userId="42949a3e-5aba-4e5d-931a-6d7b2cf6ec97" providerId="ADAL" clId="{4F27C1B4-0D77-4F3F-ADC0-57B508901BC1}" dt="2024-09-04T18:37:40.399" v="28" actId="5793"/>
+        <pc:sldMkLst>
+          <pc:docMk/>
+          <pc:sldMk cId="748689938" sldId="283"/>
+        </pc:sldMkLst>
+        <pc:spChg chg="mod">
+          <ac:chgData name="Michael Sørensen Loft" userId="42949a3e-5aba-4e5d-931a-6d7b2cf6ec97" providerId="ADAL" clId="{4F27C1B4-0D77-4F3F-ADC0-57B508901BC1}" dt="2024-09-04T18:37:40.399" v="28" actId="5793"/>
+          <ac:spMkLst>
+            <pc:docMk/>
+            <pc:sldMk cId="748689938" sldId="283"/>
+            <ac:spMk id="9" creationId="{00000000-0000-0000-0000-000000000000}"/>
+          </ac:spMkLst>
+        </pc:spChg>
+        <pc:picChg chg="del">
+          <ac:chgData name="Michael Sørensen Loft" userId="42949a3e-5aba-4e5d-931a-6d7b2cf6ec97" providerId="ADAL" clId="{4F27C1B4-0D77-4F3F-ADC0-57B508901BC1}" dt="2024-09-04T18:35:41.918" v="3" actId="478"/>
+          <ac:picMkLst>
+            <pc:docMk/>
+            <pc:sldMk cId="748689938" sldId="283"/>
+            <ac:picMk id="1026" creationId="{00000000-0000-0000-0000-000000000000}"/>
+          </ac:picMkLst>
+        </pc:picChg>
+        <pc:picChg chg="add mod">
+          <ac:chgData name="Michael Sørensen Loft" userId="42949a3e-5aba-4e5d-931a-6d7b2cf6ec97" providerId="ADAL" clId="{4F27C1B4-0D77-4F3F-ADC0-57B508901BC1}" dt="2024-09-04T18:36:02.714" v="5" actId="1076"/>
+          <ac:picMkLst>
+            <pc:docMk/>
+            <pc:sldMk cId="748689938" sldId="283"/>
+            <ac:picMk id="2050" creationId="{088F8D4C-06F7-09D0-D694-C2E4202045C2}"/>
+          </ac:picMkLst>
+        </pc:picChg>
+      </pc:sldChg>
+      <pc:sldChg chg="addSp delSp modSp mod">
+        <pc:chgData name="Michael Sørensen Loft" userId="42949a3e-5aba-4e5d-931a-6d7b2cf6ec97" providerId="ADAL" clId="{4F27C1B4-0D77-4F3F-ADC0-57B508901BC1}" dt="2024-09-04T18:36:50.453" v="16" actId="1076"/>
+        <pc:sldMkLst>
+          <pc:docMk/>
+          <pc:sldMk cId="3077109665" sldId="284"/>
+        </pc:sldMkLst>
+        <pc:spChg chg="mod">
+          <ac:chgData name="Michael Sørensen Loft" userId="42949a3e-5aba-4e5d-931a-6d7b2cf6ec97" providerId="ADAL" clId="{4F27C1B4-0D77-4F3F-ADC0-57B508901BC1}" dt="2024-09-04T18:36:39.205" v="14" actId="14100"/>
+          <ac:spMkLst>
+            <pc:docMk/>
+            <pc:sldMk cId="3077109665" sldId="284"/>
+            <ac:spMk id="4" creationId="{00000000-0000-0000-0000-000000000000}"/>
+          </ac:spMkLst>
+        </pc:spChg>
+        <pc:picChg chg="del">
+          <ac:chgData name="Michael Sørensen Loft" userId="42949a3e-5aba-4e5d-931a-6d7b2cf6ec97" providerId="ADAL" clId="{4F27C1B4-0D77-4F3F-ADC0-57B508901BC1}" dt="2024-09-04T18:36:07.792" v="6" actId="478"/>
+          <ac:picMkLst>
+            <pc:docMk/>
+            <pc:sldMk cId="3077109665" sldId="284"/>
+            <ac:picMk id="3" creationId="{00000000-0000-0000-0000-000000000000}"/>
+          </ac:picMkLst>
+        </pc:picChg>
+        <pc:picChg chg="add mod">
+          <ac:chgData name="Michael Sørensen Loft" userId="42949a3e-5aba-4e5d-931a-6d7b2cf6ec97" providerId="ADAL" clId="{4F27C1B4-0D77-4F3F-ADC0-57B508901BC1}" dt="2024-09-04T18:36:50.453" v="16" actId="1076"/>
+          <ac:picMkLst>
+            <pc:docMk/>
+            <pc:sldMk cId="3077109665" sldId="284"/>
+            <ac:picMk id="3074" creationId="{2FEA3A7F-102C-4D4D-8635-D19EA8BD52E6}"/>
+          </ac:picMkLst>
+        </pc:picChg>
+        <pc:cxnChg chg="del mod">
+          <ac:chgData name="Michael Sørensen Loft" userId="42949a3e-5aba-4e5d-931a-6d7b2cf6ec97" providerId="ADAL" clId="{4F27C1B4-0D77-4F3F-ADC0-57B508901BC1}" dt="2024-09-04T18:36:24.707" v="11" actId="478"/>
+          <ac:cxnSpMkLst>
+            <pc:docMk/>
+            <pc:sldMk cId="3077109665" sldId="284"/>
+            <ac:cxnSpMk id="9" creationId="{00000000-0000-0000-0000-000000000000}"/>
+          </ac:cxnSpMkLst>
+        </pc:cxnChg>
+      </pc:sldChg>
+    </pc:docChg>
+  </pc:docChgLst>
+</pc:chgInfo>
+</file>
+
 <file path=ppt/notesMasters/notesMaster1.xml><?xml version="1.0" encoding="utf-8"?>
 <p:notesMaster xmlns:a="http://schemas.openxmlformats.org/drawingml/2006/main" xmlns:r="http://schemas.openxmlformats.org/officeDocument/2006/relationships" xmlns:p="http://schemas.openxmlformats.org/presentationml/2006/main">
   <p:cSld>
@@ -223,7 +346,7 @@
           <a:p>
             <a:fld id="{8A6E8EB0-8888-4A4E-94F3-14D8E5038AB6}" type="datetimeFigureOut">
               <a:rPr lang="en-US" smtClean="0"/>
-              <a:t>9/4/23</a:t>
+              <a:t>9/4/2024</a:t>
             </a:fld>
             <a:endParaRPr lang="en-US" dirty="0"/>
           </a:p>
@@ -1796,7 +1919,7 @@
         </p:nvSpPr>
         <p:spPr>
           <a:xfrm>
-            <a:off x="457200" y="1844824"/>
+            <a:off x="476429" y="1551220"/>
             <a:ext cx="8229600" cy="648072"/>
           </a:xfrm>
         </p:spPr>
@@ -1806,6 +1929,9 @@
           </a:bodyPr>
           <a:lstStyle/>
           <a:p>
+            <a:pPr marL="0" indent="0">
+              <a:buNone/>
+            </a:pPr>
             <a:r>
               <a:rPr lang="da-DK" dirty="0"/>
               <a:t>Pattern </a:t>
@@ -1825,6 +1951,9 @@
             <a:endParaRPr lang="da-DK" dirty="0"/>
           </a:p>
           <a:p>
+            <a:pPr marL="0" indent="0">
+              <a:buNone/>
+            </a:pPr>
             <a:r>
               <a:rPr lang="da-DK" dirty="0" err="1"/>
               <a:t>Intent</a:t>
@@ -1983,7 +2112,13 @@
       </p:pic>
       <p:pic>
         <p:nvPicPr>
-          <p:cNvPr id="8" name="Picture 2"/>
+          <p:cNvPr id="1026" name="Picture 2">
+            <a:extLst>
+              <a:ext uri="{FF2B5EF4-FFF2-40B4-BE49-F238E27FC236}">
+                <a16:creationId xmlns:a16="http://schemas.microsoft.com/office/drawing/2014/main" id="{D700E3D3-E45E-AE80-AFE9-0873F54BB7F0}"/>
+              </a:ext>
+            </a:extLst>
+          </p:cNvPr>
           <p:cNvPicPr>
             <a:picLocks noChangeAspect="1" noChangeArrowheads="1"/>
           </p:cNvPicPr>
@@ -2004,43 +2139,20 @@
         </p:blipFill>
         <p:spPr bwMode="auto">
           <a:xfrm>
-            <a:off x="3326640" y="3789040"/>
-            <a:ext cx="3981664" cy="2326763"/>
+            <a:off x="2123728" y="3140968"/>
+            <a:ext cx="6428742" cy="2940037"/>
           </a:xfrm>
           <a:prstGeom prst="rect">
             <a:avLst/>
           </a:prstGeom>
           <a:noFill/>
-          <a:ln>
-            <a:noFill/>
-          </a:ln>
-          <a:effectLst/>
           <a:extLst>
             <a:ext uri="{909E8E84-426E-40DD-AFC4-6F175D3DCCD1}">
               <a14:hiddenFill xmlns:a14="http://schemas.microsoft.com/office/drawing/2010/main">
                 <a:solidFill>
-                  <a:schemeClr val="accent1"/>
+                  <a:srgbClr val="FFFFFF"/>
                 </a:solidFill>
               </a14:hiddenFill>
-            </a:ext>
-            <a:ext uri="{91240B29-F687-4F45-9708-019B960494DF}">
-              <a14:hiddenLine xmlns:a14="http://schemas.microsoft.com/office/drawing/2010/main" w="9525">
-                <a:solidFill>
-                  <a:schemeClr val="tx1"/>
-                </a:solidFill>
-                <a:miter lim="800000"/>
-                <a:headEnd/>
-                <a:tailEnd/>
-              </a14:hiddenLine>
-            </a:ext>
-            <a:ext uri="{AF507438-7753-43E0-B8FC-AC1667EBCBE1}">
-              <a14:hiddenEffects xmlns:a14="http://schemas.microsoft.com/office/drawing/2010/main">
-                <a:effectLst>
-                  <a:outerShdw dist="35921" dir="2700000" algn="ctr" rotWithShape="0">
-                    <a:schemeClr val="bg2"/>
-                  </a:outerShdw>
-                </a:effectLst>
-              </a14:hiddenEffects>
             </a:ext>
           </a:extLst>
         </p:spPr>
@@ -2130,6 +2242,9 @@
           </a:bodyPr>
           <a:lstStyle/>
           <a:p>
+            <a:pPr marL="0" indent="0">
+              <a:buNone/>
+            </a:pPr>
             <a:r>
               <a:rPr lang="da-DK" dirty="0"/>
               <a:t>The </a:t>
@@ -2233,6 +2348,9 @@
             <a:endParaRPr lang="da-DK" dirty="0"/>
           </a:p>
           <a:p>
+            <a:pPr marL="0" indent="0">
+              <a:buNone/>
+            </a:pPr>
             <a:r>
               <a:rPr lang="da-DK" dirty="0" err="1"/>
               <a:t>Use</a:t>
@@ -2394,7 +2512,13 @@
       </p:sp>
       <p:pic>
         <p:nvPicPr>
-          <p:cNvPr id="1026" name="Picture 2"/>
+          <p:cNvPr id="2050" name="Picture 2">
+            <a:extLst>
+              <a:ext uri="{FF2B5EF4-FFF2-40B4-BE49-F238E27FC236}">
+                <a16:creationId xmlns:a16="http://schemas.microsoft.com/office/drawing/2014/main" id="{088F8D4C-06F7-09D0-D694-C2E4202045C2}"/>
+              </a:ext>
+            </a:extLst>
+          </p:cNvPr>
           <p:cNvPicPr>
             <a:picLocks noChangeAspect="1" noChangeArrowheads="1"/>
           </p:cNvPicPr>
@@ -2415,43 +2539,20 @@
         </p:blipFill>
         <p:spPr bwMode="auto">
           <a:xfrm>
-            <a:off x="2185674" y="2398381"/>
-            <a:ext cx="4474558" cy="2614795"/>
+            <a:off x="1633716" y="2276872"/>
+            <a:ext cx="5915025" cy="2705100"/>
           </a:xfrm>
           <a:prstGeom prst="rect">
             <a:avLst/>
           </a:prstGeom>
           <a:noFill/>
-          <a:ln>
-            <a:noFill/>
-          </a:ln>
-          <a:effectLst/>
           <a:extLst>
             <a:ext uri="{909E8E84-426E-40DD-AFC4-6F175D3DCCD1}">
               <a14:hiddenFill xmlns:a14="http://schemas.microsoft.com/office/drawing/2010/main">
                 <a:solidFill>
-                  <a:schemeClr val="accent1"/>
+                  <a:srgbClr val="FFFFFF"/>
                 </a:solidFill>
               </a14:hiddenFill>
-            </a:ext>
-            <a:ext uri="{91240B29-F687-4F45-9708-019B960494DF}">
-              <a14:hiddenLine xmlns:a14="http://schemas.microsoft.com/office/drawing/2010/main" w="9525">
-                <a:solidFill>
-                  <a:schemeClr val="tx1"/>
-                </a:solidFill>
-                <a:miter lim="800000"/>
-                <a:headEnd/>
-                <a:tailEnd/>
-              </a14:hiddenLine>
-            </a:ext>
-            <a:ext uri="{AF507438-7753-43E0-B8FC-AC1667EBCBE1}">
-              <a14:hiddenEffects xmlns:a14="http://schemas.microsoft.com/office/drawing/2010/main">
-                <a:effectLst>
-                  <a:outerShdw dist="35921" dir="2700000" algn="ctr" rotWithShape="0">
-                    <a:schemeClr val="bg2"/>
-                  </a:outerShdw>
-                </a:effectLst>
-              </a14:hiddenEffects>
             </a:ext>
           </a:extLst>
         </p:spPr>
@@ -3060,30 +3161,6 @@
           </a:p>
         </p:txBody>
       </p:sp>
-      <p:pic>
-        <p:nvPicPr>
-          <p:cNvPr id="3" name="Picture 2"/>
-          <p:cNvPicPr>
-            <a:picLocks noChangeAspect="1"/>
-          </p:cNvPicPr>
-          <p:nvPr/>
-        </p:nvPicPr>
-        <p:blipFill>
-          <a:blip r:embed="rId3"/>
-          <a:stretch>
-            <a:fillRect/>
-          </a:stretch>
-        </p:blipFill>
-        <p:spPr>
-          <a:xfrm>
-            <a:off x="611560" y="1916832"/>
-            <a:ext cx="2611586" cy="1521428"/>
-          </a:xfrm>
-          <a:prstGeom prst="rect">
-            <a:avLst/>
-          </a:prstGeom>
-        </p:spPr>
-      </p:pic>
       <p:sp>
         <p:nvSpPr>
           <p:cNvPr id="4" name="TextBox 3"/>
@@ -3092,8 +3169,8 @@
         </p:nvSpPr>
         <p:spPr>
           <a:xfrm>
-            <a:off x="4716016" y="2215881"/>
-            <a:ext cx="3312368" cy="830997"/>
+            <a:off x="5436096" y="2032273"/>
+            <a:ext cx="3168352" cy="830997"/>
           </a:xfrm>
           <a:prstGeom prst="rect">
             <a:avLst/>
@@ -3213,37 +3290,53 @@
           </a:p>
         </p:txBody>
       </p:sp>
-      <p:cxnSp>
-        <p:nvCxnSpPr>
-          <p:cNvPr id="9" name="Straight Arrow Connector 8"/>
-          <p:cNvCxnSpPr>
-            <a:stCxn id="4" idx="1"/>
-          </p:cNvCxnSpPr>
+      <p:pic>
+        <p:nvPicPr>
+          <p:cNvPr id="3074" name="Picture 2">
+            <a:extLst>
+              <a:ext uri="{FF2B5EF4-FFF2-40B4-BE49-F238E27FC236}">
+                <a16:creationId xmlns:a16="http://schemas.microsoft.com/office/drawing/2014/main" id="{2FEA3A7F-102C-4D4D-8635-D19EA8BD52E6}"/>
+              </a:ext>
+            </a:extLst>
+          </p:cNvPr>
+          <p:cNvPicPr>
+            <a:picLocks noChangeAspect="1" noChangeArrowheads="1"/>
+          </p:cNvPicPr>
           <p:nvPr/>
-        </p:nvCxnSpPr>
+        </p:nvPicPr>
+        <p:blipFill>
+          <a:blip r:embed="rId3">
+            <a:extLst>
+              <a:ext uri="{28A0092B-C50C-407E-A947-70E740481C1C}">
+                <a14:useLocalDpi xmlns:a14="http://schemas.microsoft.com/office/drawing/2010/main" val="0"/>
+              </a:ext>
+            </a:extLst>
+          </a:blip>
+          <a:srcRect/>
+          <a:stretch>
+            <a:fillRect/>
+          </a:stretch>
+        </p:blipFill>
         <p:spPr bwMode="auto">
-          <a:xfrm flipH="1" flipV="1">
-            <a:off x="2915816" y="2215881"/>
-            <a:ext cx="1800200" cy="415499"/>
+          <a:xfrm>
+            <a:off x="539552" y="1890429"/>
+            <a:ext cx="5415922" cy="2476847"/>
           </a:xfrm>
-          <a:prstGeom prst="straightConnector1">
+          <a:prstGeom prst="rect">
             <a:avLst/>
           </a:prstGeom>
-          <a:solidFill>
-            <a:schemeClr val="accent2"/>
-          </a:solidFill>
-          <a:ln w="1778" cap="flat" cmpd="sng" algn="ctr">
-            <a:solidFill>
-              <a:schemeClr val="tx1"/>
-            </a:solidFill>
-            <a:prstDash val="solid"/>
-            <a:round/>
-            <a:headEnd type="none" w="med" len="med"/>
-            <a:tailEnd type="triangle"/>
-          </a:ln>
-          <a:effectLst/>
+          <a:noFill/>
+          <a:extLst>
+            <a:ext uri="{909E8E84-426E-40DD-AFC4-6F175D3DCCD1}">
+              <a14:hiddenFill xmlns:a14="http://schemas.microsoft.com/office/drawing/2010/main">
+                <a:solidFill>
+                  <a:srgbClr val="FFFFFF"/>
+                </a:solidFill>
+              </a14:hiddenFill>
+            </a:ext>
+          </a:extLst>
         </p:spPr>
-      </p:cxnSp>
+      </p:pic>
     </p:spTree>
     <p:extLst>
       <p:ext uri="{BB962C8B-B14F-4D97-AF65-F5344CB8AC3E}">

</xml_diff>